<commit_message>
Poster und Kurzfassung überarbeitet
</commit_message>
<xml_diff>
--- a/_DOCUMENTATION/06_Poster/GFTPrototype-Poster.pptx
+++ b/_DOCUMENTATION/06_Poster/GFTPrototype-Poster.pptx
@@ -7703,7 +7703,7 @@
           <p:nvPr>
             <p:extLst>
               <p:ext uri="{D42A27DB-BD31-4B8C-83A1-F6EECF244321}">
-                <p14:modId xmlns:p14="http://schemas.microsoft.com/office/powerpoint/2010/main" val="203990627"/>
+                <p14:modId xmlns:p14="http://schemas.microsoft.com/office/powerpoint/2010/main" val="3046250160"/>
               </p:ext>
             </p:extLst>
           </p:nvPr>
@@ -7792,7 +7792,79 @@
                           <a:ea typeface="+mn-ea"/>
                           <a:cs typeface="Calibri" pitchFamily="34" charset="0"/>
                         </a:rPr>
-                        <a:t>In unserer Arbeit untersuchen wir die Möglichkeiten welche die </a:t>
+                        <a:t>Ziel</a:t>
+                      </a:r>
+                      <a:r>
+                        <a:rPr lang="de-CH" sz="2800" kern="1200" baseline="0" dirty="0" smtClean="0">
+                          <a:solidFill>
+                            <a:schemeClr val="dk1"/>
+                          </a:solidFill>
+                          <a:effectLst/>
+                          <a:latin typeface="Calibri" pitchFamily="34" charset="0"/>
+                          <a:ea typeface="+mn-ea"/>
+                          <a:cs typeface="Calibri" pitchFamily="34" charset="0"/>
+                        </a:rPr>
+                        <a:t> dieser </a:t>
+                      </a:r>
+                      <a:r>
+                        <a:rPr lang="de-CH" sz="2800" kern="1200" dirty="0" smtClean="0">
+                          <a:solidFill>
+                            <a:schemeClr val="dk1"/>
+                          </a:solidFill>
+                          <a:effectLst/>
+                          <a:latin typeface="Calibri" pitchFamily="34" charset="0"/>
+                          <a:ea typeface="+mn-ea"/>
+                          <a:cs typeface="Calibri" pitchFamily="34" charset="0"/>
+                        </a:rPr>
+                        <a:t>Arbeit war das </a:t>
+                      </a:r>
+                      <a:r>
+                        <a:rPr lang="de-CH" sz="2800" kern="1200" smtClean="0">
+                          <a:solidFill>
+                            <a:schemeClr val="dk1"/>
+                          </a:solidFill>
+                          <a:effectLst/>
+                          <a:latin typeface="Calibri" pitchFamily="34" charset="0"/>
+                          <a:ea typeface="+mn-ea"/>
+                          <a:cs typeface="Calibri" pitchFamily="34" charset="0"/>
+                        </a:rPr>
+                        <a:t>Untersuchen</a:t>
+                      </a:r>
+                      <a:r>
+                        <a:rPr lang="de-CH" sz="2800" kern="1200" baseline="0" smtClean="0">
+                          <a:solidFill>
+                            <a:schemeClr val="dk1"/>
+                          </a:solidFill>
+                          <a:effectLst/>
+                          <a:latin typeface="Calibri" pitchFamily="34" charset="0"/>
+                          <a:ea typeface="+mn-ea"/>
+                          <a:cs typeface="Calibri" pitchFamily="34" charset="0"/>
+                        </a:rPr>
+                        <a:t> der </a:t>
+                      </a:r>
+                      <a:r>
+                        <a:rPr lang="de-CH" sz="2800" kern="1200" smtClean="0">
+                          <a:solidFill>
+                            <a:schemeClr val="dk1"/>
+                          </a:solidFill>
+                          <a:effectLst/>
+                          <a:latin typeface="Calibri" pitchFamily="34" charset="0"/>
+                          <a:ea typeface="+mn-ea"/>
+                          <a:cs typeface="Calibri" pitchFamily="34" charset="0"/>
+                        </a:rPr>
+                        <a:t>Möglichkeiten, </a:t>
+                      </a:r>
+                      <a:r>
+                        <a:rPr lang="de-CH" sz="2800" kern="1200" dirty="0" smtClean="0">
+                          <a:solidFill>
+                            <a:schemeClr val="dk1"/>
+                          </a:solidFill>
+                          <a:effectLst/>
+                          <a:latin typeface="Calibri" pitchFamily="34" charset="0"/>
+                          <a:ea typeface="+mn-ea"/>
+                          <a:cs typeface="Calibri" pitchFamily="34" charset="0"/>
+                        </a:rPr>
+                        <a:t>welche die </a:t>
                       </a:r>
                       <a:r>
                         <a:rPr lang="de-CH" sz="2800" kern="1200" dirty="0" err="1" smtClean="0">
@@ -8952,58 +9024,6 @@
       </p:sp>
       <p:pic>
         <p:nvPicPr>
-          <p:cNvPr id="9" name="Picture 2" descr="D:\FILES\Juerg\Desktop\juerg_sharm_quadrat.JPG"/>
-          <p:cNvPicPr>
-            <a:picLocks noChangeAspect="1" noChangeArrowheads="1"/>
-          </p:cNvPicPr>
-          <p:nvPr/>
-        </p:nvPicPr>
-        <p:blipFill>
-          <a:blip r:embed="rId26" cstate="print">
-            <a:extLst>
-              <a:ext uri="{28A0092B-C50C-407E-A947-70E740481C1C}">
-                <a14:useLocalDpi xmlns:a14="http://schemas.microsoft.com/office/drawing/2010/main" val="0"/>
-              </a:ext>
-            </a:extLst>
-          </a:blip>
-          <a:srcRect/>
-          <a:stretch>
-            <a:fillRect/>
-          </a:stretch>
-        </p:blipFill>
-        <p:spPr bwMode="auto">
-          <a:xfrm>
-            <a:off x="21995959" y="2078038"/>
-            <a:ext cx="2881407" cy="2881407"/>
-          </a:xfrm>
-          <a:prstGeom prst="rect">
-            <a:avLst/>
-          </a:prstGeom>
-          <a:ln w="88900">
-            <a:solidFill>
-              <a:schemeClr val="bg1"/>
-            </a:solidFill>
-          </a:ln>
-          <a:effectLst>
-            <a:outerShdw blurRad="190500" algn="tl" rotWithShape="0">
-              <a:srgbClr val="000000">
-                <a:alpha val="70000"/>
-              </a:srgbClr>
-            </a:outerShdw>
-          </a:effectLst>
-          <a:extLst>
-            <a:ext uri="{909E8E84-426E-40DD-AFC4-6F175D3DCCD1}">
-              <a14:hiddenFill xmlns:a14="http://schemas.microsoft.com/office/drawing/2010/main">
-                <a:solidFill>
-                  <a:srgbClr val="FFFFFF"/>
-                </a:solidFill>
-              </a14:hiddenFill>
-            </a:ext>
-          </a:extLst>
-        </p:spPr>
-      </p:pic>
-      <p:pic>
-        <p:nvPicPr>
           <p:cNvPr id="1027" name="Picture 3" descr="D:\FILES\Juerg\Desktop\283208_10150262618957668_535577667_7335132_7992693_n.jpg"/>
           <p:cNvPicPr>
             <a:picLocks noChangeAspect="1" noChangeArrowheads="1"/>
@@ -9011,7 +9031,7 @@
           <p:nvPr/>
         </p:nvPicPr>
         <p:blipFill>
-          <a:blip r:embed="rId27">
+          <a:blip r:embed="rId26">
             <a:extLst>
               <a:ext uri="{28A0092B-C50C-407E-A947-70E740481C1C}">
                 <a14:useLocalDpi xmlns:a14="http://schemas.microsoft.com/office/drawing/2010/main" val="0"/>
@@ -9050,6 +9070,77 @@
                   <a:srgbClr val="FFFFFF"/>
                 </a:solidFill>
               </a14:hiddenFill>
+            </a:ext>
+          </a:extLst>
+        </p:spPr>
+      </p:pic>
+      <p:pic>
+        <p:nvPicPr>
+          <p:cNvPr id="10" name="Picture 3"/>
+          <p:cNvPicPr>
+            <a:picLocks noChangeAspect="1" noChangeArrowheads="1"/>
+          </p:cNvPicPr>
+          <p:nvPr/>
+        </p:nvPicPr>
+        <p:blipFill rotWithShape="1">
+          <a:blip r:embed="rId27">
+            <a:extLst>
+              <a:ext uri="{BEBA8EAE-BF5A-486C-A8C5-ECC9F3942E4B}">
+                <a14:imgProps xmlns:a14="http://schemas.microsoft.com/office/drawing/2010/main">
+                  <a14:imgLayer r:embed="rId28">
+                    <a14:imgEffect>
+                      <a14:saturation sat="0"/>
+                    </a14:imgEffect>
+                  </a14:imgLayer>
+                </a14:imgProps>
+              </a:ext>
+              <a:ext uri="{28A0092B-C50C-407E-A947-70E740481C1C}">
+                <a14:useLocalDpi xmlns:a14="http://schemas.microsoft.com/office/drawing/2010/main" val="0"/>
+              </a:ext>
+            </a:extLst>
+          </a:blip>
+          <a:srcRect l="3438" t="-1" b="358"/>
+          <a:stretch/>
+        </p:blipFill>
+        <p:spPr bwMode="auto">
+          <a:xfrm>
+            <a:off x="21945025" y="2033586"/>
+            <a:ext cx="2983275" cy="2925858"/>
+          </a:xfrm>
+          <a:prstGeom prst="rect">
+            <a:avLst/>
+          </a:prstGeom>
+          <a:ln w="88900">
+            <a:solidFill>
+              <a:schemeClr val="bg1"/>
+            </a:solidFill>
+            <a:miter lim="800000"/>
+            <a:headEnd/>
+            <a:tailEnd/>
+          </a:ln>
+          <a:effectLst>
+            <a:outerShdw blurRad="190500" algn="tl" rotWithShape="0">
+              <a:srgbClr val="000000">
+                <a:alpha val="70000"/>
+              </a:srgbClr>
+            </a:outerShdw>
+          </a:effectLst>
+          <a:extLst>
+            <a:ext uri="{909E8E84-426E-40DD-AFC4-6F175D3DCCD1}">
+              <a14:hiddenFill xmlns:a14="http://schemas.microsoft.com/office/drawing/2010/main">
+                <a:solidFill>
+                  <a:schemeClr val="accent1"/>
+                </a:solidFill>
+              </a14:hiddenFill>
+            </a:ext>
+            <a:ext uri="{AF507438-7753-43E0-B8FC-AC1667EBCBE1}">
+              <a14:hiddenEffects xmlns:a14="http://schemas.microsoft.com/office/drawing/2010/main">
+                <a:effectLst>
+                  <a:outerShdw dist="35921" dir="2700000" algn="ctr" rotWithShape="0">
+                    <a:schemeClr val="bg2"/>
+                  </a:outerShdw>
+                </a:effectLst>
+              </a14:hiddenEffects>
             </a:ext>
           </a:extLst>
         </p:spPr>

</xml_diff>